<commit_message>
fix the title of ppt file
</commit_message>
<xml_diff>
--- a/completeness/experiments/experimental_results/Experimental Results.pptx
+++ b/completeness/experiments/experimental_results/Experimental Results.pptx
@@ -3017,12 +3017,8 @@
           <a:lstStyle/>
           <a:p>
             <a:r>
-              <a:rPr lang="en-US" dirty="0" err="1" smtClean="0"/>
-              <a:t>All_IVCs</a:t>
-            </a:r>
-            <a:r>
-              <a:rPr lang="en-US" dirty="0" smtClean="0"/>
-              <a:t> Algorithm</a:t>
+              <a:rPr lang="en-US" smtClean="0"/>
+              <a:t>Completeness paper</a:t>
             </a:r>
             <a:endParaRPr lang="en-US" dirty="0"/>
           </a:p>
@@ -3340,7 +3336,6 @@
                         <a:rPr lang="en-US" dirty="0" smtClean="0"/>
                         <a:t>1081.099%</a:t>
                       </a:r>
-                      <a:endParaRPr lang="en-US" dirty="0" smtClean="0"/>
                     </a:p>
                   </a:txBody>
                   <a:tcPr anchor="ctr"/>
@@ -5238,7 +5233,6 @@
                         <a:rPr lang="en-US" dirty="0" smtClean="0"/>
                         <a:t>2.54</a:t>
                       </a:r>
-                      <a:endParaRPr lang="en-US" dirty="0" smtClean="0"/>
                     </a:p>
                   </a:txBody>
                   <a:tcPr anchor="ctr"/>

</xml_diff>

<commit_message>
replave the old pic with the new one in the slides
</commit_message>
<xml_diff>
--- a/completeness/experiments/experimental_results/Experimental Results.pptx
+++ b/completeness/experiments/experimental_results/Experimental Results.pptx
@@ -7,11 +7,11 @@
   <p:sldIdLst>
     <p:sldId id="256" r:id="rId2"/>
     <p:sldId id="257" r:id="rId3"/>
-    <p:sldId id="260" r:id="rId4"/>
-    <p:sldId id="261" r:id="rId5"/>
+    <p:sldId id="271" r:id="rId4"/>
+    <p:sldId id="272" r:id="rId5"/>
     <p:sldId id="258" r:id="rId6"/>
     <p:sldId id="270" r:id="rId7"/>
-    <p:sldId id="269" r:id="rId8"/>
+    <p:sldId id="273" r:id="rId8"/>
     <p:sldId id="259" r:id="rId9"/>
     <p:sldId id="266" r:id="rId10"/>
     <p:sldId id="268" r:id="rId11"/>
@@ -252,7 +252,7 @@
           <a:p>
             <a:fld id="{899D766E-60EA-40D4-8F02-6F5AC76A935E}" type="datetimeFigureOut">
               <a:rPr lang="en-US" smtClean="0"/>
-              <a:t>8/14/2016</a:t>
+              <a:t>8/16/2016</a:t>
             </a:fld>
             <a:endParaRPr lang="en-US"/>
           </a:p>
@@ -422,7 +422,7 @@
           <a:p>
             <a:fld id="{899D766E-60EA-40D4-8F02-6F5AC76A935E}" type="datetimeFigureOut">
               <a:rPr lang="en-US" smtClean="0"/>
-              <a:t>8/14/2016</a:t>
+              <a:t>8/16/2016</a:t>
             </a:fld>
             <a:endParaRPr lang="en-US"/>
           </a:p>
@@ -602,7 +602,7 @@
           <a:p>
             <a:fld id="{899D766E-60EA-40D4-8F02-6F5AC76A935E}" type="datetimeFigureOut">
               <a:rPr lang="en-US" smtClean="0"/>
-              <a:t>8/14/2016</a:t>
+              <a:t>8/16/2016</a:t>
             </a:fld>
             <a:endParaRPr lang="en-US"/>
           </a:p>
@@ -772,7 +772,7 @@
           <a:p>
             <a:fld id="{899D766E-60EA-40D4-8F02-6F5AC76A935E}" type="datetimeFigureOut">
               <a:rPr lang="en-US" smtClean="0"/>
-              <a:t>8/14/2016</a:t>
+              <a:t>8/16/2016</a:t>
             </a:fld>
             <a:endParaRPr lang="en-US"/>
           </a:p>
@@ -1018,7 +1018,7 @@
           <a:p>
             <a:fld id="{899D766E-60EA-40D4-8F02-6F5AC76A935E}" type="datetimeFigureOut">
               <a:rPr lang="en-US" smtClean="0"/>
-              <a:t>8/14/2016</a:t>
+              <a:t>8/16/2016</a:t>
             </a:fld>
             <a:endParaRPr lang="en-US"/>
           </a:p>
@@ -1250,7 +1250,7 @@
           <a:p>
             <a:fld id="{899D766E-60EA-40D4-8F02-6F5AC76A935E}" type="datetimeFigureOut">
               <a:rPr lang="en-US" smtClean="0"/>
-              <a:t>8/14/2016</a:t>
+              <a:t>8/16/2016</a:t>
             </a:fld>
             <a:endParaRPr lang="en-US"/>
           </a:p>
@@ -1617,7 +1617,7 @@
           <a:p>
             <a:fld id="{899D766E-60EA-40D4-8F02-6F5AC76A935E}" type="datetimeFigureOut">
               <a:rPr lang="en-US" smtClean="0"/>
-              <a:t>8/14/2016</a:t>
+              <a:t>8/16/2016</a:t>
             </a:fld>
             <a:endParaRPr lang="en-US"/>
           </a:p>
@@ -1735,7 +1735,7 @@
           <a:p>
             <a:fld id="{899D766E-60EA-40D4-8F02-6F5AC76A935E}" type="datetimeFigureOut">
               <a:rPr lang="en-US" smtClean="0"/>
-              <a:t>8/14/2016</a:t>
+              <a:t>8/16/2016</a:t>
             </a:fld>
             <a:endParaRPr lang="en-US"/>
           </a:p>
@@ -1830,7 +1830,7 @@
           <a:p>
             <a:fld id="{899D766E-60EA-40D4-8F02-6F5AC76A935E}" type="datetimeFigureOut">
               <a:rPr lang="en-US" smtClean="0"/>
-              <a:t>8/14/2016</a:t>
+              <a:t>8/16/2016</a:t>
             </a:fld>
             <a:endParaRPr lang="en-US"/>
           </a:p>
@@ -2107,7 +2107,7 @@
           <a:p>
             <a:fld id="{899D766E-60EA-40D4-8F02-6F5AC76A935E}" type="datetimeFigureOut">
               <a:rPr lang="en-US" smtClean="0"/>
-              <a:t>8/14/2016</a:t>
+              <a:t>8/16/2016</a:t>
             </a:fld>
             <a:endParaRPr lang="en-US"/>
           </a:p>
@@ -2360,7 +2360,7 @@
           <a:p>
             <a:fld id="{899D766E-60EA-40D4-8F02-6F5AC76A935E}" type="datetimeFigureOut">
               <a:rPr lang="en-US" smtClean="0"/>
-              <a:t>8/14/2016</a:t>
+              <a:t>8/16/2016</a:t>
             </a:fld>
             <a:endParaRPr lang="en-US"/>
           </a:p>
@@ -2573,7 +2573,7 @@
           <a:p>
             <a:fld id="{899D766E-60EA-40D4-8F02-6F5AC76A935E}" type="datetimeFigureOut">
               <a:rPr lang="en-US" smtClean="0"/>
-              <a:t>8/14/2016</a:t>
+              <a:t>8/16/2016</a:t>
             </a:fld>
             <a:endParaRPr lang="en-US"/>
           </a:p>
@@ -3574,13 +3574,34 @@
           <a:chExt cx="0" cy="0"/>
         </a:xfrm>
       </p:grpSpPr>
+      <p:sp>
+        <p:nvSpPr>
+          <p:cNvPr id="2" name="Title 1"/>
+          <p:cNvSpPr>
+            <a:spLocks noGrp="1"/>
+          </p:cNvSpPr>
+          <p:nvPr>
+            <p:ph type="title"/>
+          </p:nvPr>
+        </p:nvSpPr>
+        <p:spPr/>
+        <p:txBody>
+          <a:bodyPr/>
+          <a:lstStyle/>
+          <a:p>
+            <a:endParaRPr lang="en-US"/>
+          </a:p>
+        </p:txBody>
+      </p:sp>
       <p:pic>
         <p:nvPicPr>
-          <p:cNvPr id="3" name="Picture 2"/>
+          <p:cNvPr id="4" name="Content Placeholder 3"/>
           <p:cNvPicPr>
-            <a:picLocks noChangeAspect="1"/>
+            <a:picLocks noGrp="1" noChangeAspect="1"/>
           </p:cNvPicPr>
-          <p:nvPr/>
+          <p:nvPr>
+            <p:ph idx="1"/>
+          </p:nvPr>
         </p:nvPicPr>
         <p:blipFill>
           <a:blip r:embed="rId2">
@@ -3596,18 +3617,15 @@
         </p:blipFill>
         <p:spPr>
           <a:xfrm>
-            <a:off x="-127000" y="225296"/>
-            <a:ext cx="12192000" cy="6632704"/>
+            <a:off x="327230" y="233891"/>
+            <a:ext cx="11600364" cy="6310842"/>
           </a:xfrm>
-          <a:prstGeom prst="rect">
-            <a:avLst/>
-          </a:prstGeom>
         </p:spPr>
       </p:pic>
     </p:spTree>
     <p:extLst>
       <p:ext uri="{BB962C8B-B14F-4D97-AF65-F5344CB8AC3E}">
-        <p14:creationId xmlns:p14="http://schemas.microsoft.com/office/powerpoint/2010/main" val="240425741"/>
+        <p14:creationId xmlns:p14="http://schemas.microsoft.com/office/powerpoint/2010/main" val="5440263"/>
       </p:ext>
     </p:extLst>
   </p:cSld>
@@ -3655,7 +3673,7 @@
       </p:sp>
       <p:pic>
         <p:nvPicPr>
-          <p:cNvPr id="5" name="Content Placeholder 4"/>
+          <p:cNvPr id="4" name="Content Placeholder 3"/>
           <p:cNvPicPr>
             <a:picLocks noGrp="1" noChangeAspect="1"/>
           </p:cNvPicPr>
@@ -3677,15 +3695,15 @@
         </p:blipFill>
         <p:spPr>
           <a:xfrm>
-            <a:off x="361096" y="293158"/>
-            <a:ext cx="11475304" cy="6242807"/>
+            <a:off x="462695" y="208490"/>
+            <a:ext cx="11242413" cy="6116109"/>
           </a:xfrm>
         </p:spPr>
       </p:pic>
     </p:spTree>
     <p:extLst>
       <p:ext uri="{BB962C8B-B14F-4D97-AF65-F5344CB8AC3E}">
-        <p14:creationId xmlns:p14="http://schemas.microsoft.com/office/powerpoint/2010/main" val="1492926059"/>
+        <p14:creationId xmlns:p14="http://schemas.microsoft.com/office/powerpoint/2010/main" val="3395299253"/>
       </p:ext>
     </p:extLst>
   </p:cSld>
@@ -4983,7 +5001,7 @@
       </p:sp>
       <p:pic>
         <p:nvPicPr>
-          <p:cNvPr id="5" name="Content Placeholder 4"/>
+          <p:cNvPr id="4" name="Content Placeholder 3"/>
           <p:cNvPicPr>
             <a:picLocks noGrp="1" noChangeAspect="1"/>
           </p:cNvPicPr>
@@ -5005,15 +5023,15 @@
         </p:blipFill>
         <p:spPr>
           <a:xfrm>
-            <a:off x="267964" y="225425"/>
-            <a:ext cx="11500704" cy="6395508"/>
+            <a:off x="211667" y="219453"/>
+            <a:ext cx="11658029" cy="6342213"/>
           </a:xfrm>
         </p:spPr>
       </p:pic>
     </p:spTree>
     <p:extLst>
       <p:ext uri="{BB962C8B-B14F-4D97-AF65-F5344CB8AC3E}">
-        <p14:creationId xmlns:p14="http://schemas.microsoft.com/office/powerpoint/2010/main" val="558616771"/>
+        <p14:creationId xmlns:p14="http://schemas.microsoft.com/office/powerpoint/2010/main" val="3519524950"/>
       </p:ext>
     </p:extLst>
   </p:cSld>

</xml_diff>